<commit_message>
Finalized exercise and added function building
</commit_message>
<xml_diff>
--- a/presentations/pptx/03-Using tidyverse.pptx
+++ b/presentations/pptx/03-Using tidyverse.pptx
@@ -6375,12 +6375,6 @@
             <a:r>
               <a:rPr lang="en-US" dirty="0"/>
               <a:t>Open 03-tidyverse.Rmd and solve exercise 1</a:t>
-            </a:r>
-          </a:p>
-          <a:p>
-            <a:r>
-              <a:rPr lang="en-US" dirty="0"/>
-              <a:t>Work up to question 5.</a:t>
             </a:r>
           </a:p>
         </p:txBody>
@@ -8037,7 +8031,11 @@
           <a:p>
             <a:r>
               <a:rPr lang="en-US" dirty="0"/>
-              <a:t>Conceptual map</a:t>
+              <a:t>Conceptual map of </a:t>
+            </a:r>
+            <a:r>
+              <a:rPr lang="en-US" dirty="0" err="1"/>
+              <a:t>dplyr</a:t>
             </a:r>
             <a:endParaRPr lang="en-IL" dirty="0"/>
           </a:p>
@@ -8115,7 +8113,7 @@
         </p:nvSpPr>
         <p:spPr>
           <a:xfrm>
-            <a:off x="5155040" y="3029657"/>
+            <a:off x="5381372" y="3337464"/>
             <a:ext cx="1638677" cy="941561"/>
           </a:xfrm>
           <a:prstGeom prst="roundRect">
@@ -8169,7 +8167,7 @@
         </p:nvSpPr>
         <p:spPr>
           <a:xfrm>
-            <a:off x="7627699" y="3029657"/>
+            <a:off x="7854031" y="3337464"/>
             <a:ext cx="1638677" cy="941561"/>
           </a:xfrm>
           <a:prstGeom prst="roundRect">
@@ -8223,7 +8221,7 @@
         </p:nvSpPr>
         <p:spPr>
           <a:xfrm>
-            <a:off x="9746209" y="1894721"/>
+            <a:off x="9972541" y="2202528"/>
             <a:ext cx="1638677" cy="1089670"/>
           </a:xfrm>
           <a:prstGeom prst="roundRect">
@@ -8292,7 +8290,7 @@
         </p:nvSpPr>
         <p:spPr>
           <a:xfrm>
-            <a:off x="2831166" y="1907028"/>
+            <a:off x="3057498" y="2214835"/>
             <a:ext cx="1638677" cy="1521972"/>
           </a:xfrm>
           <a:prstGeom prst="roundRect">
@@ -8380,7 +8378,7 @@
         </p:nvSpPr>
         <p:spPr>
           <a:xfrm>
-            <a:off x="2831166" y="4176774"/>
+            <a:off x="3057498" y="4484581"/>
             <a:ext cx="1638677" cy="1521972"/>
           </a:xfrm>
           <a:prstGeom prst="roundRect">
@@ -8443,7 +8441,7 @@
         </p:nvSpPr>
         <p:spPr>
           <a:xfrm>
-            <a:off x="9746209" y="4083752"/>
+            <a:off x="9972541" y="4391559"/>
             <a:ext cx="1638677" cy="1521972"/>
           </a:xfrm>
           <a:prstGeom prst="roundRect">
@@ -8515,7 +8513,7 @@
         </p:nvSpPr>
         <p:spPr>
           <a:xfrm>
-            <a:off x="153142" y="1907028"/>
+            <a:off x="379474" y="2214835"/>
             <a:ext cx="1638677" cy="1521972"/>
           </a:xfrm>
           <a:prstGeom prst="roundRect">
@@ -8590,6 +8588,295 @@
           </a:p>
         </p:txBody>
       </p:sp>
+      <p:cxnSp>
+        <p:nvCxnSpPr>
+          <p:cNvPr id="14" name="Straight Arrow Connector 13">
+            <a:extLst>
+              <a:ext uri="{FF2B5EF4-FFF2-40B4-BE49-F238E27FC236}">
+                <a16:creationId xmlns:a16="http://schemas.microsoft.com/office/drawing/2014/main" id="{9D12C402-D013-4D66-9BA4-F746D905C43F}"/>
+              </a:ext>
+            </a:extLst>
+          </p:cNvPr>
+          <p:cNvCxnSpPr>
+            <a:stCxn id="6" idx="1"/>
+            <a:endCxn id="9" idx="3"/>
+          </p:cNvCxnSpPr>
+          <p:nvPr/>
+        </p:nvCxnSpPr>
+        <p:spPr>
+          <a:xfrm flipH="1" flipV="1">
+            <a:off x="4696175" y="2975821"/>
+            <a:ext cx="685197" cy="832424"/>
+          </a:xfrm>
+          <a:prstGeom prst="straightConnector1">
+            <a:avLst/>
+          </a:prstGeom>
+          <a:ln w="9525" cap="flat" cmpd="sng" algn="ctr">
+            <a:solidFill>
+              <a:schemeClr val="dk1"/>
+            </a:solidFill>
+            <a:prstDash val="solid"/>
+            <a:round/>
+            <a:headEnd type="none" w="med" len="med"/>
+            <a:tailEnd type="arrow" w="med" len="med"/>
+          </a:ln>
+        </p:spPr>
+        <p:style>
+          <a:lnRef idx="0">
+            <a:scrgbClr r="0" g="0" b="0"/>
+          </a:lnRef>
+          <a:fillRef idx="0">
+            <a:scrgbClr r="0" g="0" b="0"/>
+          </a:fillRef>
+          <a:effectRef idx="0">
+            <a:scrgbClr r="0" g="0" b="0"/>
+          </a:effectRef>
+          <a:fontRef idx="minor">
+            <a:schemeClr val="tx1"/>
+          </a:fontRef>
+        </p:style>
+      </p:cxnSp>
+      <p:cxnSp>
+        <p:nvCxnSpPr>
+          <p:cNvPr id="16" name="Straight Arrow Connector 15">
+            <a:extLst>
+              <a:ext uri="{FF2B5EF4-FFF2-40B4-BE49-F238E27FC236}">
+                <a16:creationId xmlns:a16="http://schemas.microsoft.com/office/drawing/2014/main" id="{4AD9755F-FC68-4CB4-AB00-7D8863791A37}"/>
+              </a:ext>
+            </a:extLst>
+          </p:cNvPr>
+          <p:cNvCxnSpPr>
+            <a:cxnSpLocks/>
+            <a:stCxn id="9" idx="1"/>
+            <a:endCxn id="12" idx="3"/>
+          </p:cNvCxnSpPr>
+          <p:nvPr/>
+        </p:nvCxnSpPr>
+        <p:spPr>
+          <a:xfrm flipH="1">
+            <a:off x="2018151" y="2975821"/>
+            <a:ext cx="1039347" cy="0"/>
+          </a:xfrm>
+          <a:prstGeom prst="straightConnector1">
+            <a:avLst/>
+          </a:prstGeom>
+          <a:ln w="9525" cap="flat" cmpd="sng" algn="ctr">
+            <a:solidFill>
+              <a:schemeClr val="dk1"/>
+            </a:solidFill>
+            <a:prstDash val="solid"/>
+            <a:round/>
+            <a:headEnd type="none" w="med" len="med"/>
+            <a:tailEnd type="arrow" w="med" len="med"/>
+          </a:ln>
+        </p:spPr>
+        <p:style>
+          <a:lnRef idx="0">
+            <a:scrgbClr r="0" g="0" b="0"/>
+          </a:lnRef>
+          <a:fillRef idx="0">
+            <a:scrgbClr r="0" g="0" b="0"/>
+          </a:fillRef>
+          <a:effectRef idx="0">
+            <a:scrgbClr r="0" g="0" b="0"/>
+          </a:effectRef>
+          <a:fontRef idx="minor">
+            <a:schemeClr val="tx1"/>
+          </a:fontRef>
+        </p:style>
+      </p:cxnSp>
+      <p:cxnSp>
+        <p:nvCxnSpPr>
+          <p:cNvPr id="18" name="Straight Arrow Connector 17">
+            <a:extLst>
+              <a:ext uri="{FF2B5EF4-FFF2-40B4-BE49-F238E27FC236}">
+                <a16:creationId xmlns:a16="http://schemas.microsoft.com/office/drawing/2014/main" id="{F7755F1D-986C-4B9F-B422-5EFD171B5D87}"/>
+              </a:ext>
+            </a:extLst>
+          </p:cNvPr>
+          <p:cNvCxnSpPr>
+            <a:stCxn id="6" idx="1"/>
+            <a:endCxn id="10" idx="3"/>
+          </p:cNvCxnSpPr>
+          <p:nvPr/>
+        </p:nvCxnSpPr>
+        <p:spPr>
+          <a:xfrm flipH="1">
+            <a:off x="4696175" y="3808245"/>
+            <a:ext cx="685197" cy="1437322"/>
+          </a:xfrm>
+          <a:prstGeom prst="straightConnector1">
+            <a:avLst/>
+          </a:prstGeom>
+          <a:ln w="9525" cap="flat" cmpd="sng" algn="ctr">
+            <a:solidFill>
+              <a:schemeClr val="dk1"/>
+            </a:solidFill>
+            <a:prstDash val="solid"/>
+            <a:round/>
+            <a:headEnd type="none" w="med" len="med"/>
+            <a:tailEnd type="arrow" w="med" len="med"/>
+          </a:ln>
+        </p:spPr>
+        <p:style>
+          <a:lnRef idx="0">
+            <a:scrgbClr r="0" g="0" b="0"/>
+          </a:lnRef>
+          <a:fillRef idx="0">
+            <a:scrgbClr r="0" g="0" b="0"/>
+          </a:fillRef>
+          <a:effectRef idx="0">
+            <a:scrgbClr r="0" g="0" b="0"/>
+          </a:effectRef>
+          <a:fontRef idx="minor">
+            <a:schemeClr val="tx1"/>
+          </a:fontRef>
+        </p:style>
+      </p:cxnSp>
+      <p:cxnSp>
+        <p:nvCxnSpPr>
+          <p:cNvPr id="20" name="Straight Arrow Connector 19">
+            <a:extLst>
+              <a:ext uri="{FF2B5EF4-FFF2-40B4-BE49-F238E27FC236}">
+                <a16:creationId xmlns:a16="http://schemas.microsoft.com/office/drawing/2014/main" id="{2D030E69-0E8A-4212-8975-AA923F8A6294}"/>
+              </a:ext>
+            </a:extLst>
+          </p:cNvPr>
+          <p:cNvCxnSpPr>
+            <a:stCxn id="7" idx="3"/>
+            <a:endCxn id="8" idx="1"/>
+          </p:cNvCxnSpPr>
+          <p:nvPr/>
+        </p:nvCxnSpPr>
+        <p:spPr>
+          <a:xfrm flipV="1">
+            <a:off x="9492708" y="2747363"/>
+            <a:ext cx="479833" cy="1060882"/>
+          </a:xfrm>
+          <a:prstGeom prst="straightConnector1">
+            <a:avLst/>
+          </a:prstGeom>
+          <a:ln w="9525" cap="flat" cmpd="sng" algn="ctr">
+            <a:solidFill>
+              <a:schemeClr val="dk1"/>
+            </a:solidFill>
+            <a:prstDash val="solid"/>
+            <a:round/>
+            <a:headEnd type="none" w="med" len="med"/>
+            <a:tailEnd type="arrow" w="med" len="med"/>
+          </a:ln>
+        </p:spPr>
+        <p:style>
+          <a:lnRef idx="0">
+            <a:scrgbClr r="0" g="0" b="0"/>
+          </a:lnRef>
+          <a:fillRef idx="0">
+            <a:scrgbClr r="0" g="0" b="0"/>
+          </a:fillRef>
+          <a:effectRef idx="0">
+            <a:scrgbClr r="0" g="0" b="0"/>
+          </a:effectRef>
+          <a:fontRef idx="minor">
+            <a:schemeClr val="tx1"/>
+          </a:fontRef>
+        </p:style>
+      </p:cxnSp>
+      <p:cxnSp>
+        <p:nvCxnSpPr>
+          <p:cNvPr id="22" name="Straight Arrow Connector 21">
+            <a:extLst>
+              <a:ext uri="{FF2B5EF4-FFF2-40B4-BE49-F238E27FC236}">
+                <a16:creationId xmlns:a16="http://schemas.microsoft.com/office/drawing/2014/main" id="{BFFC51D5-6520-4BC6-9291-80B733850BDE}"/>
+              </a:ext>
+            </a:extLst>
+          </p:cNvPr>
+          <p:cNvCxnSpPr>
+            <a:stCxn id="7" idx="3"/>
+            <a:endCxn id="11" idx="1"/>
+          </p:cNvCxnSpPr>
+          <p:nvPr/>
+        </p:nvCxnSpPr>
+        <p:spPr>
+          <a:xfrm>
+            <a:off x="9492708" y="3808245"/>
+            <a:ext cx="479833" cy="1344300"/>
+          </a:xfrm>
+          <a:prstGeom prst="straightConnector1">
+            <a:avLst/>
+          </a:prstGeom>
+          <a:ln w="9525" cap="flat" cmpd="sng" algn="ctr">
+            <a:solidFill>
+              <a:schemeClr val="dk1"/>
+            </a:solidFill>
+            <a:prstDash val="solid"/>
+            <a:round/>
+            <a:headEnd type="none" w="med" len="med"/>
+            <a:tailEnd type="arrow" w="med" len="med"/>
+          </a:ln>
+        </p:spPr>
+        <p:style>
+          <a:lnRef idx="0">
+            <a:scrgbClr r="0" g="0" b="0"/>
+          </a:lnRef>
+          <a:fillRef idx="0">
+            <a:scrgbClr r="0" g="0" b="0"/>
+          </a:fillRef>
+          <a:effectRef idx="0">
+            <a:scrgbClr r="0" g="0" b="0"/>
+          </a:effectRef>
+          <a:fontRef idx="minor">
+            <a:schemeClr val="tx1"/>
+          </a:fontRef>
+        </p:style>
+      </p:cxnSp>
+      <p:cxnSp>
+        <p:nvCxnSpPr>
+          <p:cNvPr id="24" name="Straight Arrow Connector 23">
+            <a:extLst>
+              <a:ext uri="{FF2B5EF4-FFF2-40B4-BE49-F238E27FC236}">
+                <a16:creationId xmlns:a16="http://schemas.microsoft.com/office/drawing/2014/main" id="{04B7950C-0E3F-4948-AC0B-0E45D9BB12CE}"/>
+              </a:ext>
+            </a:extLst>
+          </p:cNvPr>
+          <p:cNvCxnSpPr>
+            <a:stCxn id="7" idx="1"/>
+            <a:endCxn id="6" idx="3"/>
+          </p:cNvCxnSpPr>
+          <p:nvPr/>
+        </p:nvCxnSpPr>
+        <p:spPr>
+          <a:xfrm flipH="1">
+            <a:off x="7020049" y="3808245"/>
+            <a:ext cx="833982" cy="0"/>
+          </a:xfrm>
+          <a:prstGeom prst="straightConnector1">
+            <a:avLst/>
+          </a:prstGeom>
+          <a:ln w="9525" cap="flat" cmpd="sng" algn="ctr">
+            <a:solidFill>
+              <a:schemeClr val="dk1"/>
+            </a:solidFill>
+            <a:prstDash val="solid"/>
+            <a:round/>
+            <a:headEnd type="arrow" w="med" len="med"/>
+            <a:tailEnd type="arrow" w="med" len="med"/>
+          </a:ln>
+        </p:spPr>
+        <p:style>
+          <a:lnRef idx="0">
+            <a:scrgbClr r="0" g="0" b="0"/>
+          </a:lnRef>
+          <a:fillRef idx="0">
+            <a:scrgbClr r="0" g="0" b="0"/>
+          </a:fillRef>
+          <a:effectRef idx="0">
+            <a:scrgbClr r="0" g="0" b="0"/>
+          </a:effectRef>
+          <a:fontRef idx="minor">
+            <a:schemeClr val="tx1"/>
+          </a:fontRef>
+        </p:style>
+      </p:cxnSp>
     </p:spTree>
     <p:extLst>
       <p:ext uri="{BB962C8B-B14F-4D97-AF65-F5344CB8AC3E}">

</xml_diff>

<commit_message>
Added building tidy functions exercise and pptx
</commit_message>
<xml_diff>
--- a/presentations/pptx/03-Using tidyverse.pptx
+++ b/presentations/pptx/03-Using tidyverse.pptx
@@ -5,7 +5,7 @@
     <p:sldMasterId id="2147483840" r:id="rId1"/>
   </p:sldMasterIdLst>
   <p:notesMasterIdLst>
-    <p:notesMasterId r:id="rId17"/>
+    <p:notesMasterId r:id="rId15"/>
   </p:notesMasterIdLst>
   <p:sldIdLst>
     <p:sldId id="256" r:id="rId2"/>
@@ -21,8 +21,6 @@
     <p:sldId id="269" r:id="rId12"/>
     <p:sldId id="262" r:id="rId13"/>
     <p:sldId id="260" r:id="rId14"/>
-    <p:sldId id="267" r:id="rId15"/>
-    <p:sldId id="268" r:id="rId16"/>
   </p:sldIdLst>
   <p:sldSz cx="12192000" cy="6858000"/>
   <p:notesSz cx="6858000" cy="9144000"/>
@@ -6441,305 +6439,6 @@
     <p:extLst>
       <p:ext uri="{BB962C8B-B14F-4D97-AF65-F5344CB8AC3E}">
         <p14:creationId xmlns:p14="http://schemas.microsoft.com/office/powerpoint/2010/main" val="3842053279"/>
-      </p:ext>
-    </p:extLst>
-  </p:cSld>
-  <p:clrMapOvr>
-    <a:masterClrMapping/>
-  </p:clrMapOvr>
-</p:sld>
-</file>
-
-<file path=ppt/slides/slide14.xml><?xml version="1.0" encoding="utf-8"?>
-<p:sld xmlns:a="http://schemas.openxmlformats.org/drawingml/2006/main" xmlns:r="http://schemas.openxmlformats.org/officeDocument/2006/relationships" xmlns:p="http://schemas.openxmlformats.org/presentationml/2006/main">
-  <p:cSld>
-    <p:spTree>
-      <p:nvGrpSpPr>
-        <p:cNvPr id="1" name=""/>
-        <p:cNvGrpSpPr/>
-        <p:nvPr/>
-      </p:nvGrpSpPr>
-      <p:grpSpPr>
-        <a:xfrm>
-          <a:off x="0" y="0"/>
-          <a:ext cx="0" cy="0"/>
-          <a:chOff x="0" y="0"/>
-          <a:chExt cx="0" cy="0"/>
-        </a:xfrm>
-      </p:grpSpPr>
-      <p:sp>
-        <p:nvSpPr>
-          <p:cNvPr id="2" name="Title 1">
-            <a:extLst>
-              <a:ext uri="{FF2B5EF4-FFF2-40B4-BE49-F238E27FC236}">
-                <a16:creationId xmlns:a16="http://schemas.microsoft.com/office/drawing/2014/main" id="{9C7884C1-34F8-4C60-8871-A05994A579D1}"/>
-              </a:ext>
-            </a:extLst>
-          </p:cNvPr>
-          <p:cNvSpPr>
-            <a:spLocks noGrp="1"/>
-          </p:cNvSpPr>
-          <p:nvPr>
-            <p:ph type="title"/>
-          </p:nvPr>
-        </p:nvSpPr>
-        <p:spPr/>
-        <p:txBody>
-          <a:bodyPr/>
-          <a:lstStyle/>
-          <a:p>
-            <a:r>
-              <a:rPr lang="en-US" dirty="0"/>
-              <a:t>Building tidy-style functions</a:t>
-            </a:r>
-            <a:br>
-              <a:rPr lang="en-US" dirty="0"/>
-            </a:br>
-            <a:r>
-              <a:rPr lang="en-US" dirty="0"/>
-              <a:t>Using non-standard evaluation</a:t>
-            </a:r>
-            <a:endParaRPr lang="en-IL" dirty="0"/>
-          </a:p>
-        </p:txBody>
-      </p:sp>
-      <p:sp>
-        <p:nvSpPr>
-          <p:cNvPr id="3" name="Content Placeholder 2">
-            <a:extLst>
-              <a:ext uri="{FF2B5EF4-FFF2-40B4-BE49-F238E27FC236}">
-                <a16:creationId xmlns:a16="http://schemas.microsoft.com/office/drawing/2014/main" id="{96ADD4A3-54A8-4C4F-A9B1-F76998D3C257}"/>
-              </a:ext>
-            </a:extLst>
-          </p:cNvPr>
-          <p:cNvSpPr>
-            <a:spLocks noGrp="1"/>
-          </p:cNvSpPr>
-          <p:nvPr>
-            <p:ph idx="1"/>
-          </p:nvPr>
-        </p:nvSpPr>
-        <p:spPr/>
-        <p:txBody>
-          <a:bodyPr/>
-          <a:lstStyle/>
-          <a:p>
-            <a:endParaRPr lang="en-IL"/>
-          </a:p>
-        </p:txBody>
-      </p:sp>
-      <p:sp>
-        <p:nvSpPr>
-          <p:cNvPr id="4" name="Footer Placeholder 3">
-            <a:extLst>
-              <a:ext uri="{FF2B5EF4-FFF2-40B4-BE49-F238E27FC236}">
-                <a16:creationId xmlns:a16="http://schemas.microsoft.com/office/drawing/2014/main" id="{5F941338-7E67-4FE9-B521-A30545885723}"/>
-              </a:ext>
-            </a:extLst>
-          </p:cNvPr>
-          <p:cNvSpPr>
-            <a:spLocks noGrp="1"/>
-          </p:cNvSpPr>
-          <p:nvPr>
-            <p:ph type="ftr" sz="quarter" idx="11"/>
-          </p:nvPr>
-        </p:nvSpPr>
-        <p:spPr/>
-        <p:txBody>
-          <a:bodyPr/>
-          <a:lstStyle/>
-          <a:p>
-            <a:r>
-              <a:rPr lang="en-US"/>
-              <a:t>Materials by Adi Sarid https://adisarid.github.io and http://www.sarid-ins.com</a:t>
-            </a:r>
-            <a:endParaRPr lang="en-US" dirty="0"/>
-          </a:p>
-        </p:txBody>
-      </p:sp>
-      <p:sp>
-        <p:nvSpPr>
-          <p:cNvPr id="5" name="Slide Number Placeholder 4">
-            <a:extLst>
-              <a:ext uri="{FF2B5EF4-FFF2-40B4-BE49-F238E27FC236}">
-                <a16:creationId xmlns:a16="http://schemas.microsoft.com/office/drawing/2014/main" id="{41098458-B148-4DA2-93DF-FD1CA6DDCAF8}"/>
-              </a:ext>
-            </a:extLst>
-          </p:cNvPr>
-          <p:cNvSpPr>
-            <a:spLocks noGrp="1"/>
-          </p:cNvSpPr>
-          <p:nvPr>
-            <p:ph type="sldNum" sz="quarter" idx="12"/>
-          </p:nvPr>
-        </p:nvSpPr>
-        <p:spPr/>
-        <p:txBody>
-          <a:bodyPr/>
-          <a:lstStyle/>
-          <a:p>
-            <a:fld id="{4FAB73BC-B049-4115-A692-8D63A059BFB8}" type="slidenum">
-              <a:rPr lang="en-US" smtClean="0"/>
-              <a:t>14</a:t>
-            </a:fld>
-            <a:endParaRPr lang="en-US" dirty="0"/>
-          </a:p>
-        </p:txBody>
-      </p:sp>
-    </p:spTree>
-    <p:extLst>
-      <p:ext uri="{BB962C8B-B14F-4D97-AF65-F5344CB8AC3E}">
-        <p14:creationId xmlns:p14="http://schemas.microsoft.com/office/powerpoint/2010/main" val="2457603497"/>
-      </p:ext>
-    </p:extLst>
-  </p:cSld>
-  <p:clrMapOvr>
-    <a:masterClrMapping/>
-  </p:clrMapOvr>
-</p:sld>
-</file>
-
-<file path=ppt/slides/slide15.xml><?xml version="1.0" encoding="utf-8"?>
-<p:sld xmlns:a="http://schemas.openxmlformats.org/drawingml/2006/main" xmlns:r="http://schemas.openxmlformats.org/officeDocument/2006/relationships" xmlns:p="http://schemas.openxmlformats.org/presentationml/2006/main">
-  <p:cSld>
-    <p:spTree>
-      <p:nvGrpSpPr>
-        <p:cNvPr id="1" name=""/>
-        <p:cNvGrpSpPr/>
-        <p:nvPr/>
-      </p:nvGrpSpPr>
-      <p:grpSpPr>
-        <a:xfrm>
-          <a:off x="0" y="0"/>
-          <a:ext cx="0" cy="0"/>
-          <a:chOff x="0" y="0"/>
-          <a:chExt cx="0" cy="0"/>
-        </a:xfrm>
-      </p:grpSpPr>
-      <p:sp>
-        <p:nvSpPr>
-          <p:cNvPr id="2" name="Title 1">
-            <a:extLst>
-              <a:ext uri="{FF2B5EF4-FFF2-40B4-BE49-F238E27FC236}">
-                <a16:creationId xmlns:a16="http://schemas.microsoft.com/office/drawing/2014/main" id="{746D07C0-2B60-4769-A996-B4C8F4EC2E52}"/>
-              </a:ext>
-            </a:extLst>
-          </p:cNvPr>
-          <p:cNvSpPr>
-            <a:spLocks noGrp="1"/>
-          </p:cNvSpPr>
-          <p:nvPr>
-            <p:ph type="title"/>
-          </p:nvPr>
-        </p:nvSpPr>
-        <p:spPr/>
-        <p:txBody>
-          <a:bodyPr/>
-          <a:lstStyle/>
-          <a:p>
-            <a:r>
-              <a:rPr lang="en-US" dirty="0"/>
-              <a:t>Using </a:t>
-            </a:r>
-            <a:r>
-              <a:rPr lang="en-US" dirty="0" err="1"/>
-              <a:t>purrr</a:t>
-            </a:r>
-            <a:r>
-              <a:rPr lang="en-US" dirty="0"/>
-              <a:t> for iterations</a:t>
-            </a:r>
-            <a:endParaRPr lang="en-IL" dirty="0"/>
-          </a:p>
-        </p:txBody>
-      </p:sp>
-      <p:sp>
-        <p:nvSpPr>
-          <p:cNvPr id="3" name="Content Placeholder 2">
-            <a:extLst>
-              <a:ext uri="{FF2B5EF4-FFF2-40B4-BE49-F238E27FC236}">
-                <a16:creationId xmlns:a16="http://schemas.microsoft.com/office/drawing/2014/main" id="{899DD9C6-5BCA-4640-B6E0-6377122208B3}"/>
-              </a:ext>
-            </a:extLst>
-          </p:cNvPr>
-          <p:cNvSpPr>
-            <a:spLocks noGrp="1"/>
-          </p:cNvSpPr>
-          <p:nvPr>
-            <p:ph idx="1"/>
-          </p:nvPr>
-        </p:nvSpPr>
-        <p:spPr/>
-        <p:txBody>
-          <a:bodyPr/>
-          <a:lstStyle/>
-          <a:p>
-            <a:endParaRPr lang="en-IL"/>
-          </a:p>
-        </p:txBody>
-      </p:sp>
-      <p:sp>
-        <p:nvSpPr>
-          <p:cNvPr id="4" name="Footer Placeholder 3">
-            <a:extLst>
-              <a:ext uri="{FF2B5EF4-FFF2-40B4-BE49-F238E27FC236}">
-                <a16:creationId xmlns:a16="http://schemas.microsoft.com/office/drawing/2014/main" id="{54B85431-04FB-4A8C-8DD2-9AE1AC4541E5}"/>
-              </a:ext>
-            </a:extLst>
-          </p:cNvPr>
-          <p:cNvSpPr>
-            <a:spLocks noGrp="1"/>
-          </p:cNvSpPr>
-          <p:nvPr>
-            <p:ph type="ftr" sz="quarter" idx="11"/>
-          </p:nvPr>
-        </p:nvSpPr>
-        <p:spPr/>
-        <p:txBody>
-          <a:bodyPr/>
-          <a:lstStyle/>
-          <a:p>
-            <a:r>
-              <a:rPr lang="en-US"/>
-              <a:t>Materials by Adi Sarid https://adisarid.github.io and http://www.sarid-ins.com</a:t>
-            </a:r>
-            <a:endParaRPr lang="en-US" dirty="0"/>
-          </a:p>
-        </p:txBody>
-      </p:sp>
-      <p:sp>
-        <p:nvSpPr>
-          <p:cNvPr id="5" name="Slide Number Placeholder 4">
-            <a:extLst>
-              <a:ext uri="{FF2B5EF4-FFF2-40B4-BE49-F238E27FC236}">
-                <a16:creationId xmlns:a16="http://schemas.microsoft.com/office/drawing/2014/main" id="{75E362D8-B0CB-4B30-A0DB-499DE44E3BE1}"/>
-              </a:ext>
-            </a:extLst>
-          </p:cNvPr>
-          <p:cNvSpPr>
-            <a:spLocks noGrp="1"/>
-          </p:cNvSpPr>
-          <p:nvPr>
-            <p:ph type="sldNum" sz="quarter" idx="12"/>
-          </p:nvPr>
-        </p:nvSpPr>
-        <p:spPr/>
-        <p:txBody>
-          <a:bodyPr/>
-          <a:lstStyle/>
-          <a:p>
-            <a:fld id="{4FAB73BC-B049-4115-A692-8D63A059BFB8}" type="slidenum">
-              <a:rPr lang="en-US" smtClean="0"/>
-              <a:t>15</a:t>
-            </a:fld>
-            <a:endParaRPr lang="en-US" dirty="0"/>
-          </a:p>
-        </p:txBody>
-      </p:sp>
-    </p:spTree>
-    <p:extLst>
-      <p:ext uri="{BB962C8B-B14F-4D97-AF65-F5344CB8AC3E}">
-        <p14:creationId xmlns:p14="http://schemas.microsoft.com/office/powerpoint/2010/main" val="967270522"/>
       </p:ext>
     </p:extLst>
   </p:cSld>

</xml_diff>